<commit_message>
nu verwijzen naar echte DB dus opgelet met vragen toevoegen
</commit_message>
<xml_diff>
--- a/Presentatie/2015 06 09 Presentatie.pptx
+++ b/Presentatie/2015 06 09 Presentatie.pptx
@@ -7,6 +7,9 @@
   <p:notesMasterIdLst>
     <p:notesMasterId r:id="rId38"/>
   </p:notesMasterIdLst>
+  <p:handoutMasterIdLst>
+    <p:handoutMasterId r:id="rId39"/>
+  </p:handoutMasterIdLst>
   <p:sldIdLst>
     <p:sldId id="256" r:id="rId2"/>
     <p:sldId id="257" r:id="rId3"/>
@@ -46,7 +49,7 @@
     <p:sldId id="272" r:id="rId37"/>
   </p:sldIdLst>
   <p:sldSz cx="9144000" cy="6858000" type="screen4x3"/>
-  <p:notesSz cx="6858000" cy="9144000"/>
+  <p:notesSz cx="6797675" cy="9928225"/>
   <p:defaultTextStyle>
     <a:defPPr>
       <a:defRPr lang="nl-NL"/>
@@ -144,7 +147,7 @@
   </p:defaultTextStyle>
   <p:extLst>
     <p:ext uri="{EFAFB233-063F-42B5-8137-9DF3F51BA10A}">
-      <p15:sldGuideLst xmlns="" xmlns:p15="http://schemas.microsoft.com/office/powerpoint/2012/main">
+      <p15:sldGuideLst xmlns:p15="http://schemas.microsoft.com/office/powerpoint/2012/main" xmlns="">
         <p15:guide id="1" orient="horz" pos="2160">
           <p15:clr>
             <a:srgbClr val="A4A3A4"/>
@@ -159,6 +162,171 @@
     </p:ext>
   </p:extLst>
 </p:presentation>
+</file>
+
+<file path=ppt/handoutMasters/handoutMaster1.xml><?xml version="1.0" encoding="utf-8"?>
+<p:handoutMaster xmlns:a="http://schemas.openxmlformats.org/drawingml/2006/main" xmlns:r="http://schemas.openxmlformats.org/officeDocument/2006/relationships" xmlns:p="http://schemas.openxmlformats.org/presentationml/2006/main">
+  <p:cSld>
+    <p:bg>
+      <p:bgRef idx="1001">
+        <a:schemeClr val="bg1"/>
+      </p:bgRef>
+    </p:bg>
+    <p:spTree>
+      <p:nvGrpSpPr>
+        <p:cNvPr id="1" name=""/>
+        <p:cNvGrpSpPr/>
+        <p:nvPr/>
+      </p:nvGrpSpPr>
+      <p:grpSpPr>
+        <a:xfrm>
+          <a:off x="0" y="0"/>
+          <a:ext cx="0" cy="0"/>
+          <a:chOff x="0" y="0"/>
+          <a:chExt cx="0" cy="0"/>
+        </a:xfrm>
+      </p:grpSpPr>
+      <p:sp>
+        <p:nvSpPr>
+          <p:cNvPr id="2" name="Tijdelijke aanduiding voor koptekst 1"/>
+          <p:cNvSpPr>
+            <a:spLocks noGrp="1"/>
+          </p:cNvSpPr>
+          <p:nvPr>
+            <p:ph type="hdr" sz="quarter"/>
+          </p:nvPr>
+        </p:nvSpPr>
+        <p:spPr>
+          <a:xfrm>
+            <a:off x="0" y="0"/>
+            <a:ext cx="2945659" cy="496411"/>
+          </a:xfrm>
+          <a:prstGeom prst="rect">
+            <a:avLst/>
+          </a:prstGeom>
+        </p:spPr>
+        <p:txBody>
+          <a:bodyPr vert="horz" lIns="91440" tIns="45720" rIns="91440" bIns="45720" rtlCol="0"/>
+          <a:lstStyle>
+            <a:lvl1pPr algn="l">
+              <a:defRPr sz="1200"/>
+            </a:lvl1pPr>
+          </a:lstStyle>
+          <a:p>
+            <a:endParaRPr lang="nl-BE"/>
+          </a:p>
+        </p:txBody>
+      </p:sp>
+      <p:sp>
+        <p:nvSpPr>
+          <p:cNvPr id="3" name="Tijdelijke aanduiding voor datum 2"/>
+          <p:cNvSpPr>
+            <a:spLocks noGrp="1"/>
+          </p:cNvSpPr>
+          <p:nvPr>
+            <p:ph type="dt" sz="quarter" idx="1"/>
+          </p:nvPr>
+        </p:nvSpPr>
+        <p:spPr>
+          <a:xfrm>
+            <a:off x="3850443" y="0"/>
+            <a:ext cx="2945659" cy="496411"/>
+          </a:xfrm>
+          <a:prstGeom prst="rect">
+            <a:avLst/>
+          </a:prstGeom>
+        </p:spPr>
+        <p:txBody>
+          <a:bodyPr vert="horz" lIns="91440" tIns="45720" rIns="91440" bIns="45720" rtlCol="0"/>
+          <a:lstStyle>
+            <a:lvl1pPr algn="r">
+              <a:defRPr sz="1200"/>
+            </a:lvl1pPr>
+          </a:lstStyle>
+          <a:p>
+            <a:fld id="{9CC3FEB5-4DED-4A9A-8834-D99A912103C2}" type="datetimeFigureOut">
+              <a:rPr lang="nl-BE" smtClean="0"/>
+              <a:t>10/06/2015</a:t>
+            </a:fld>
+            <a:endParaRPr lang="nl-BE"/>
+          </a:p>
+        </p:txBody>
+      </p:sp>
+      <p:sp>
+        <p:nvSpPr>
+          <p:cNvPr id="4" name="Tijdelijke aanduiding voor voettekst 3"/>
+          <p:cNvSpPr>
+            <a:spLocks noGrp="1"/>
+          </p:cNvSpPr>
+          <p:nvPr>
+            <p:ph type="ftr" sz="quarter" idx="2"/>
+          </p:nvPr>
+        </p:nvSpPr>
+        <p:spPr>
+          <a:xfrm>
+            <a:off x="0" y="9430091"/>
+            <a:ext cx="2945659" cy="496411"/>
+          </a:xfrm>
+          <a:prstGeom prst="rect">
+            <a:avLst/>
+          </a:prstGeom>
+        </p:spPr>
+        <p:txBody>
+          <a:bodyPr vert="horz" lIns="91440" tIns="45720" rIns="91440" bIns="45720" rtlCol="0" anchor="b"/>
+          <a:lstStyle>
+            <a:lvl1pPr algn="l">
+              <a:defRPr sz="1200"/>
+            </a:lvl1pPr>
+          </a:lstStyle>
+          <a:p>
+            <a:endParaRPr lang="nl-BE"/>
+          </a:p>
+        </p:txBody>
+      </p:sp>
+      <p:sp>
+        <p:nvSpPr>
+          <p:cNvPr id="5" name="Tijdelijke aanduiding voor dianummer 4"/>
+          <p:cNvSpPr>
+            <a:spLocks noGrp="1"/>
+          </p:cNvSpPr>
+          <p:nvPr>
+            <p:ph type="sldNum" sz="quarter" idx="3"/>
+          </p:nvPr>
+        </p:nvSpPr>
+        <p:spPr>
+          <a:xfrm>
+            <a:off x="3850443" y="9430091"/>
+            <a:ext cx="2945659" cy="496411"/>
+          </a:xfrm>
+          <a:prstGeom prst="rect">
+            <a:avLst/>
+          </a:prstGeom>
+        </p:spPr>
+        <p:txBody>
+          <a:bodyPr vert="horz" lIns="91440" tIns="45720" rIns="91440" bIns="45720" rtlCol="0" anchor="b"/>
+          <a:lstStyle>
+            <a:lvl1pPr algn="r">
+              <a:defRPr sz="1200"/>
+            </a:lvl1pPr>
+          </a:lstStyle>
+          <a:p>
+            <a:fld id="{628E1CB0-008D-48D1-95CA-9BB012587821}" type="slidenum">
+              <a:rPr lang="nl-BE" smtClean="0"/>
+              <a:t>‹nr.›</a:t>
+            </a:fld>
+            <a:endParaRPr lang="nl-BE"/>
+          </a:p>
+        </p:txBody>
+      </p:sp>
+    </p:spTree>
+    <p:extLst>
+      <p:ext uri="{BB962C8B-B14F-4D97-AF65-F5344CB8AC3E}">
+        <p14:creationId xmlns:p14="http://schemas.microsoft.com/office/powerpoint/2010/main" val="3506967403"/>
+      </p:ext>
+    </p:extLst>
+  </p:cSld>
+  <p:clrMap bg1="lt1" tx1="dk1" bg2="lt2" tx2="dk2" accent1="accent1" accent2="accent2" accent3="accent3" accent4="accent4" accent5="accent5" accent6="accent6" hlink="hlink" folHlink="folHlink"/>
+</p:handoutMaster>
 </file>
 
 <file path=ppt/notesMasters/notesMaster1.xml><?xml version="1.0" encoding="utf-8"?>
@@ -196,7 +364,7 @@
         <p:spPr>
           <a:xfrm>
             <a:off x="0" y="0"/>
-            <a:ext cx="2971800" cy="457200"/>
+            <a:ext cx="2945659" cy="496411"/>
           </a:xfrm>
           <a:prstGeom prst="rect">
             <a:avLst/>
@@ -226,8 +394,8 @@
         </p:nvSpPr>
         <p:spPr>
           <a:xfrm>
-            <a:off x="3884613" y="0"/>
-            <a:ext cx="2971800" cy="457200"/>
+            <a:off x="3850443" y="0"/>
+            <a:ext cx="2945659" cy="496411"/>
           </a:xfrm>
           <a:prstGeom prst="rect">
             <a:avLst/>
@@ -243,7 +411,7 @@
           <a:p>
             <a:fld id="{76CB4545-7074-4987-9311-BC63D77EFF55}" type="datetimeFigureOut">
               <a:rPr lang="nl-BE" smtClean="0"/>
-              <a:t>9/06/2015</a:t>
+              <a:t>10/06/2015</a:t>
             </a:fld>
             <a:endParaRPr lang="nl-BE"/>
           </a:p>
@@ -261,8 +429,8 @@
         </p:nvSpPr>
         <p:spPr>
           <a:xfrm>
-            <a:off x="1143000" y="685800"/>
-            <a:ext cx="4572000" cy="3429000"/>
+            <a:off x="917575" y="744538"/>
+            <a:ext cx="4962525" cy="3722687"/>
           </a:xfrm>
           <a:prstGeom prst="rect">
             <a:avLst/>
@@ -294,8 +462,8 @@
         </p:nvSpPr>
         <p:spPr>
           <a:xfrm>
-            <a:off x="685800" y="4343400"/>
-            <a:ext cx="5486400" cy="4114800"/>
+            <a:off x="679768" y="4715907"/>
+            <a:ext cx="5438140" cy="4467701"/>
           </a:xfrm>
           <a:prstGeom prst="rect">
             <a:avLst/>
@@ -354,8 +522,8 @@
         </p:nvSpPr>
         <p:spPr>
           <a:xfrm>
-            <a:off x="0" y="8685213"/>
-            <a:ext cx="2971800" cy="457200"/>
+            <a:off x="0" y="9430091"/>
+            <a:ext cx="2945659" cy="496411"/>
           </a:xfrm>
           <a:prstGeom prst="rect">
             <a:avLst/>
@@ -385,8 +553,8 @@
         </p:nvSpPr>
         <p:spPr>
           <a:xfrm>
-            <a:off x="3884613" y="8685213"/>
-            <a:ext cx="2971800" cy="457200"/>
+            <a:off x="3850443" y="9430091"/>
+            <a:ext cx="2945659" cy="496411"/>
           </a:xfrm>
           <a:prstGeom prst="rect">
             <a:avLst/>
@@ -578,10 +746,10 @@
           </a:p>
           <a:p>
             <a:r>
-              <a:rPr lang="nl-BE" smtClean="0"/>
+              <a:rPr lang="nl-BE" dirty="0" smtClean="0"/>
               <a:t>Opbouw DB</a:t>
             </a:r>
-            <a:endParaRPr lang="nl-BE"/>
+            <a:endParaRPr lang="nl-BE" dirty="0"/>
           </a:p>
         </p:txBody>
       </p:sp>
@@ -2960,7 +3128,7 @@
                 </a:solidFill>
               </a:rPr>
               <a:pPr/>
-              <a:t>6/9/2015</a:t>
+              <a:t>6/10/2015</a:t>
             </a:fld>
             <a:endParaRPr lang="en-US" dirty="0">
               <a:solidFill>
@@ -3152,7 +3320,7 @@
                 </a:solidFill>
               </a:rPr>
               <a:pPr/>
-              <a:t>6/9/2015</a:t>
+              <a:t>6/10/2015</a:t>
             </a:fld>
             <a:endParaRPr lang="en-US" dirty="0">
               <a:solidFill>
@@ -3397,7 +3565,7 @@
                 </a:solidFill>
               </a:rPr>
               <a:pPr/>
-              <a:t>6/9/2015</a:t>
+              <a:t>6/10/2015</a:t>
             </a:fld>
             <a:endParaRPr lang="en-US" dirty="0">
               <a:solidFill>
@@ -3599,7 +3767,7 @@
                 </a:solidFill>
               </a:rPr>
               <a:pPr/>
-              <a:t>6/9/2015</a:t>
+              <a:t>6/10/2015</a:t>
             </a:fld>
             <a:endParaRPr lang="en-US" dirty="0">
               <a:solidFill>
@@ -3927,7 +4095,7 @@
                 </a:solidFill>
               </a:rPr>
               <a:pPr/>
-              <a:t>6/9/2015</a:t>
+              <a:t>6/10/2015</a:t>
             </a:fld>
             <a:endParaRPr lang="en-US" dirty="0">
               <a:solidFill>
@@ -4253,7 +4421,7 @@
                 </a:solidFill>
               </a:rPr>
               <a:pPr/>
-              <a:t>6/9/2015</a:t>
+              <a:t>6/10/2015</a:t>
             </a:fld>
             <a:endParaRPr lang="en-US" dirty="0">
               <a:solidFill>
@@ -4697,7 +4865,7 @@
                 </a:solidFill>
               </a:rPr>
               <a:pPr/>
-              <a:t>6/9/2015</a:t>
+              <a:t>6/10/2015</a:t>
             </a:fld>
             <a:endParaRPr lang="en-US" dirty="0">
               <a:solidFill>
@@ -4837,7 +5005,7 @@
                 </a:solidFill>
               </a:rPr>
               <a:pPr/>
-              <a:t>6/9/2015</a:t>
+              <a:t>6/10/2015</a:t>
             </a:fld>
             <a:endParaRPr lang="en-US" dirty="0">
               <a:solidFill>
@@ -4954,7 +5122,7 @@
                 </a:solidFill>
               </a:rPr>
               <a:pPr/>
-              <a:t>6/9/2015</a:t>
+              <a:t>6/10/2015</a:t>
             </a:fld>
             <a:endParaRPr lang="en-US" dirty="0">
               <a:solidFill>
@@ -5249,7 +5417,7 @@
                 </a:solidFill>
               </a:rPr>
               <a:pPr/>
-              <a:t>6/9/2015</a:t>
+              <a:t>6/10/2015</a:t>
             </a:fld>
             <a:endParaRPr lang="en-US" dirty="0">
               <a:solidFill>
@@ -5536,7 +5704,7 @@
                 </a:solidFill>
               </a:rPr>
               <a:pPr/>
-              <a:t>6/9/2015</a:t>
+              <a:t>6/10/2015</a:t>
             </a:fld>
             <a:endParaRPr lang="en-US" dirty="0">
               <a:solidFill>
@@ -5808,7 +5976,7 @@
                 </a:solidFill>
               </a:rPr>
               <a:pPr defTabSz="457200"/>
-              <a:t>6/9/2015</a:t>
+              <a:t>6/10/2015</a:t>
             </a:fld>
             <a:endParaRPr lang="en-US" dirty="0">
               <a:solidFill>
@@ -25693,7 +25861,6 @@
               <a:rPr lang="nl-BE" dirty="0"/>
               <a:t>concept</a:t>
             </a:r>
-            <a:endParaRPr lang="nl-BE" dirty="0"/>
           </a:p>
         </p:txBody>
       </p:sp>
@@ -25947,7 +26114,7 @@
       </p:sp>
       <p:pic>
         <p:nvPicPr>
-          <p:cNvPr id="1026" name="Picture 2" descr="C:\Users\ceja\Dropbox\CVO INF\Programmeren 4\Project\InstantInterview\Presentatie\Instant Interview - slim.png"/>
+          <p:cNvPr id="3" name="Picture 2" descr="C:\Users\ceja\Dropbox\CVO INF\Programmeren 4\Project\InstantInterview\Presentatie\Instant Interview - slim-2.png"/>
           <p:cNvPicPr>
             <a:picLocks noChangeAspect="1" noChangeArrowheads="1"/>
           </p:cNvPicPr>
@@ -25968,7 +26135,7 @@
         </p:blipFill>
         <p:spPr bwMode="auto">
           <a:xfrm>
-            <a:off x="899591" y="2708920"/>
+            <a:off x="775222" y="2636912"/>
             <a:ext cx="7667625" cy="3857625"/>
           </a:xfrm>
           <a:prstGeom prst="rect">
@@ -27245,7 +27412,7 @@
   <a:extraClrSchemeLst/>
   <a:extLst>
     <a:ext uri="{05A4C25C-085E-4340-85A3-A5531E510DB2}">
-      <thm15:themeFamily xmlns="" xmlns:thm15="http://schemas.microsoft.com/office/thememl/2012/main" name="Banded" id="{98DFF888-2449-4D28-977C-6306C017633E}" vid="{9792607F-9579-4224-82FF-9C88C3E1E53D}"/>
+      <thm15:themeFamily xmlns:thm15="http://schemas.microsoft.com/office/thememl/2012/main" xmlns="" name="Banded" id="{98DFF888-2449-4D28-977C-6306C017633E}" vid="{9792607F-9579-4224-82FF-9C88C3E1E53D}"/>
     </a:ext>
   </a:extLst>
 </a:theme>
@@ -27534,4 +27701,289 @@
   <a:objectDefaults/>
   <a:extraClrSchemeLst/>
 </a:theme>
+</file>
+
+<file path=ppt/theme/theme3.xml><?xml version="1.0" encoding="utf-8"?>
+<a:theme xmlns:a="http://schemas.openxmlformats.org/drawingml/2006/main" name="Kantoorthema">
+  <a:themeElements>
+    <a:clrScheme name="Kantoor">
+      <a:dk1>
+        <a:sysClr val="windowText" lastClr="000000"/>
+      </a:dk1>
+      <a:lt1>
+        <a:sysClr val="window" lastClr="FFFFFF"/>
+      </a:lt1>
+      <a:dk2>
+        <a:srgbClr val="1F497D"/>
+      </a:dk2>
+      <a:lt2>
+        <a:srgbClr val="EEECE1"/>
+      </a:lt2>
+      <a:accent1>
+        <a:srgbClr val="4F81BD"/>
+      </a:accent1>
+      <a:accent2>
+        <a:srgbClr val="C0504D"/>
+      </a:accent2>
+      <a:accent3>
+        <a:srgbClr val="9BBB59"/>
+      </a:accent3>
+      <a:accent4>
+        <a:srgbClr val="8064A2"/>
+      </a:accent4>
+      <a:accent5>
+        <a:srgbClr val="4BACC6"/>
+      </a:accent5>
+      <a:accent6>
+        <a:srgbClr val="F79646"/>
+      </a:accent6>
+      <a:hlink>
+        <a:srgbClr val="0000FF"/>
+      </a:hlink>
+      <a:folHlink>
+        <a:srgbClr val="800080"/>
+      </a:folHlink>
+    </a:clrScheme>
+    <a:fontScheme name="Kantoor">
+      <a:majorFont>
+        <a:latin typeface="Calibri"/>
+        <a:ea typeface=""/>
+        <a:cs typeface=""/>
+        <a:font script="Jpan" typeface="ＭＳ Ｐゴシック"/>
+        <a:font script="Hang" typeface="맑은 고딕"/>
+        <a:font script="Hans" typeface="宋体"/>
+        <a:font script="Hant" typeface="新細明體"/>
+        <a:font script="Arab" typeface="Times New Roman"/>
+        <a:font script="Hebr" typeface="Times New Roman"/>
+        <a:font script="Thai" typeface="Angsana New"/>
+        <a:font script="Ethi" typeface="Nyala"/>
+        <a:font script="Beng" typeface="Vrinda"/>
+        <a:font script="Gujr" typeface="Shruti"/>
+        <a:font script="Khmr" typeface="MoolBoran"/>
+        <a:font script="Knda" typeface="Tunga"/>
+        <a:font script="Guru" typeface="Raavi"/>
+        <a:font script="Cans" typeface="Euphemia"/>
+        <a:font script="Cher" typeface="Plantagenet Cherokee"/>
+        <a:font script="Yiii" typeface="Microsoft Yi Baiti"/>
+        <a:font script="Tibt" typeface="Microsoft Himalaya"/>
+        <a:font script="Thaa" typeface="MV Boli"/>
+        <a:font script="Deva" typeface="Mangal"/>
+        <a:font script="Telu" typeface="Gautami"/>
+        <a:font script="Taml" typeface="Latha"/>
+        <a:font script="Syrc" typeface="Estrangelo Edessa"/>
+        <a:font script="Orya" typeface="Kalinga"/>
+        <a:font script="Mlym" typeface="Kartika"/>
+        <a:font script="Laoo" typeface="DokChampa"/>
+        <a:font script="Sinh" typeface="Iskoola Pota"/>
+        <a:font script="Mong" typeface="Mongolian Baiti"/>
+        <a:font script="Viet" typeface="Times New Roman"/>
+        <a:font script="Uigh" typeface="Microsoft Uighur"/>
+        <a:font script="Geor" typeface="Sylfaen"/>
+      </a:majorFont>
+      <a:minorFont>
+        <a:latin typeface="Calibri"/>
+        <a:ea typeface=""/>
+        <a:cs typeface=""/>
+        <a:font script="Jpan" typeface="ＭＳ Ｐゴシック"/>
+        <a:font script="Hang" typeface="맑은 고딕"/>
+        <a:font script="Hans" typeface="宋体"/>
+        <a:font script="Hant" typeface="新細明體"/>
+        <a:font script="Arab" typeface="Arial"/>
+        <a:font script="Hebr" typeface="Arial"/>
+        <a:font script="Thai" typeface="Cordia New"/>
+        <a:font script="Ethi" typeface="Nyala"/>
+        <a:font script="Beng" typeface="Vrinda"/>
+        <a:font script="Gujr" typeface="Shruti"/>
+        <a:font script="Khmr" typeface="DaunPenh"/>
+        <a:font script="Knda" typeface="Tunga"/>
+        <a:font script="Guru" typeface="Raavi"/>
+        <a:font script="Cans" typeface="Euphemia"/>
+        <a:font script="Cher" typeface="Plantagenet Cherokee"/>
+        <a:font script="Yiii" typeface="Microsoft Yi Baiti"/>
+        <a:font script="Tibt" typeface="Microsoft Himalaya"/>
+        <a:font script="Thaa" typeface="MV Boli"/>
+        <a:font script="Deva" typeface="Mangal"/>
+        <a:font script="Telu" typeface="Gautami"/>
+        <a:font script="Taml" typeface="Latha"/>
+        <a:font script="Syrc" typeface="Estrangelo Edessa"/>
+        <a:font script="Orya" typeface="Kalinga"/>
+        <a:font script="Mlym" typeface="Kartika"/>
+        <a:font script="Laoo" typeface="DokChampa"/>
+        <a:font script="Sinh" typeface="Iskoola Pota"/>
+        <a:font script="Mong" typeface="Mongolian Baiti"/>
+        <a:font script="Viet" typeface="Arial"/>
+        <a:font script="Uigh" typeface="Microsoft Uighur"/>
+        <a:font script="Geor" typeface="Sylfaen"/>
+      </a:minorFont>
+    </a:fontScheme>
+    <a:fmtScheme name="Kantoor">
+      <a:fillStyleLst>
+        <a:solidFill>
+          <a:schemeClr val="phClr"/>
+        </a:solidFill>
+        <a:gradFill rotWithShape="1">
+          <a:gsLst>
+            <a:gs pos="0">
+              <a:schemeClr val="phClr">
+                <a:tint val="50000"/>
+                <a:satMod val="300000"/>
+              </a:schemeClr>
+            </a:gs>
+            <a:gs pos="35000">
+              <a:schemeClr val="phClr">
+                <a:tint val="37000"/>
+                <a:satMod val="300000"/>
+              </a:schemeClr>
+            </a:gs>
+            <a:gs pos="100000">
+              <a:schemeClr val="phClr">
+                <a:tint val="15000"/>
+                <a:satMod val="350000"/>
+              </a:schemeClr>
+            </a:gs>
+          </a:gsLst>
+          <a:lin ang="16200000" scaled="1"/>
+        </a:gradFill>
+        <a:gradFill rotWithShape="1">
+          <a:gsLst>
+            <a:gs pos="0">
+              <a:schemeClr val="phClr">
+                <a:shade val="51000"/>
+                <a:satMod val="130000"/>
+              </a:schemeClr>
+            </a:gs>
+            <a:gs pos="80000">
+              <a:schemeClr val="phClr">
+                <a:shade val="93000"/>
+                <a:satMod val="130000"/>
+              </a:schemeClr>
+            </a:gs>
+            <a:gs pos="100000">
+              <a:schemeClr val="phClr">
+                <a:shade val="94000"/>
+                <a:satMod val="135000"/>
+              </a:schemeClr>
+            </a:gs>
+          </a:gsLst>
+          <a:lin ang="16200000" scaled="0"/>
+        </a:gradFill>
+      </a:fillStyleLst>
+      <a:lnStyleLst>
+        <a:ln w="9525" cap="flat" cmpd="sng" algn="ctr">
+          <a:solidFill>
+            <a:schemeClr val="phClr">
+              <a:shade val="95000"/>
+              <a:satMod val="105000"/>
+            </a:schemeClr>
+          </a:solidFill>
+          <a:prstDash val="solid"/>
+        </a:ln>
+        <a:ln w="25400" cap="flat" cmpd="sng" algn="ctr">
+          <a:solidFill>
+            <a:schemeClr val="phClr"/>
+          </a:solidFill>
+          <a:prstDash val="solid"/>
+        </a:ln>
+        <a:ln w="38100" cap="flat" cmpd="sng" algn="ctr">
+          <a:solidFill>
+            <a:schemeClr val="phClr"/>
+          </a:solidFill>
+          <a:prstDash val="solid"/>
+        </a:ln>
+      </a:lnStyleLst>
+      <a:effectStyleLst>
+        <a:effectStyle>
+          <a:effectLst>
+            <a:outerShdw blurRad="40000" dist="20000" dir="5400000" rotWithShape="0">
+              <a:srgbClr val="000000">
+                <a:alpha val="38000"/>
+              </a:srgbClr>
+            </a:outerShdw>
+          </a:effectLst>
+        </a:effectStyle>
+        <a:effectStyle>
+          <a:effectLst>
+            <a:outerShdw blurRad="40000" dist="23000" dir="5400000" rotWithShape="0">
+              <a:srgbClr val="000000">
+                <a:alpha val="35000"/>
+              </a:srgbClr>
+            </a:outerShdw>
+          </a:effectLst>
+        </a:effectStyle>
+        <a:effectStyle>
+          <a:effectLst>
+            <a:outerShdw blurRad="40000" dist="23000" dir="5400000" rotWithShape="0">
+              <a:srgbClr val="000000">
+                <a:alpha val="35000"/>
+              </a:srgbClr>
+            </a:outerShdw>
+          </a:effectLst>
+          <a:scene3d>
+            <a:camera prst="orthographicFront">
+              <a:rot lat="0" lon="0" rev="0"/>
+            </a:camera>
+            <a:lightRig rig="threePt" dir="t">
+              <a:rot lat="0" lon="0" rev="1200000"/>
+            </a:lightRig>
+          </a:scene3d>
+          <a:sp3d>
+            <a:bevelT w="63500" h="25400"/>
+          </a:sp3d>
+        </a:effectStyle>
+      </a:effectStyleLst>
+      <a:bgFillStyleLst>
+        <a:solidFill>
+          <a:schemeClr val="phClr"/>
+        </a:solidFill>
+        <a:gradFill rotWithShape="1">
+          <a:gsLst>
+            <a:gs pos="0">
+              <a:schemeClr val="phClr">
+                <a:tint val="40000"/>
+                <a:satMod val="350000"/>
+              </a:schemeClr>
+            </a:gs>
+            <a:gs pos="40000">
+              <a:schemeClr val="phClr">
+                <a:tint val="45000"/>
+                <a:shade val="99000"/>
+                <a:satMod val="350000"/>
+              </a:schemeClr>
+            </a:gs>
+            <a:gs pos="100000">
+              <a:schemeClr val="phClr">
+                <a:shade val="20000"/>
+                <a:satMod val="255000"/>
+              </a:schemeClr>
+            </a:gs>
+          </a:gsLst>
+          <a:path path="circle">
+            <a:fillToRect l="50000" t="-80000" r="50000" b="180000"/>
+          </a:path>
+        </a:gradFill>
+        <a:gradFill rotWithShape="1">
+          <a:gsLst>
+            <a:gs pos="0">
+              <a:schemeClr val="phClr">
+                <a:tint val="80000"/>
+                <a:satMod val="300000"/>
+              </a:schemeClr>
+            </a:gs>
+            <a:gs pos="100000">
+              <a:schemeClr val="phClr">
+                <a:shade val="30000"/>
+                <a:satMod val="200000"/>
+              </a:schemeClr>
+            </a:gs>
+          </a:gsLst>
+          <a:path path="circle">
+            <a:fillToRect l="50000" t="50000" r="50000" b="50000"/>
+          </a:path>
+        </a:gradFill>
+      </a:bgFillStyleLst>
+    </a:fmtScheme>
+  </a:themeElements>
+  <a:objectDefaults/>
+  <a:extraClrSchemeLst/>
+</a:theme>
 </file>
</xml_diff>